<commit_message>
app-pedido: Menu (not ready) + icons on buttons
</commit_message>
<xml_diff>
--- a/project/Diseño Farvenca Móvil.pptx
+++ b/project/Diseño Farvenca Móvil.pptx
@@ -8,7 +8,7 @@
     <p:sldId id="256" r:id="rId2"/>
     <p:sldId id="257" r:id="rId3"/>
     <p:sldId id="258" r:id="rId4"/>
-    <p:sldId id="259" r:id="rId5"/>
+    <p:sldId id="260" r:id="rId5"/>
   </p:sldIdLst>
   <p:sldSz cx="12192000" cy="6858000"/>
   <p:notesSz cx="6858000" cy="9144000"/>
@@ -107,6 +107,11 @@
       </a:defRPr>
     </a:lvl9pPr>
   </p:defaultTextStyle>
+  <p:extLst>
+    <p:ext uri="{EFAFB233-063F-42B5-8137-9DF3F51BA10A}">
+      <p15:sldGuideLst xmlns:p15="http://schemas.microsoft.com/office/powerpoint/2012/main"/>
+    </p:ext>
+  </p:extLst>
 </p:presentation>
 </file>
 
@@ -241,7 +246,7 @@
           <a:p>
             <a:fld id="{3339173D-53CC-4538-9D97-FAD269B40F5D}" type="datetimeFigureOut">
               <a:rPr lang="es-VE" smtClean="0"/>
-              <a:t>22/7/2016</a:t>
+              <a:t>25/7/2016</a:t>
             </a:fld>
             <a:endParaRPr lang="es-VE"/>
           </a:p>
@@ -411,7 +416,7 @@
           <a:p>
             <a:fld id="{3339173D-53CC-4538-9D97-FAD269B40F5D}" type="datetimeFigureOut">
               <a:rPr lang="es-VE" smtClean="0"/>
-              <a:t>22/7/2016</a:t>
+              <a:t>25/7/2016</a:t>
             </a:fld>
             <a:endParaRPr lang="es-VE"/>
           </a:p>
@@ -591,7 +596,7 @@
           <a:p>
             <a:fld id="{3339173D-53CC-4538-9D97-FAD269B40F5D}" type="datetimeFigureOut">
               <a:rPr lang="es-VE" smtClean="0"/>
-              <a:t>22/7/2016</a:t>
+              <a:t>25/7/2016</a:t>
             </a:fld>
             <a:endParaRPr lang="es-VE"/>
           </a:p>
@@ -761,7 +766,7 @@
           <a:p>
             <a:fld id="{3339173D-53CC-4538-9D97-FAD269B40F5D}" type="datetimeFigureOut">
               <a:rPr lang="es-VE" smtClean="0"/>
-              <a:t>22/7/2016</a:t>
+              <a:t>25/7/2016</a:t>
             </a:fld>
             <a:endParaRPr lang="es-VE"/>
           </a:p>
@@ -1007,7 +1012,7 @@
           <a:p>
             <a:fld id="{3339173D-53CC-4538-9D97-FAD269B40F5D}" type="datetimeFigureOut">
               <a:rPr lang="es-VE" smtClean="0"/>
-              <a:t>22/7/2016</a:t>
+              <a:t>25/7/2016</a:t>
             </a:fld>
             <a:endParaRPr lang="es-VE"/>
           </a:p>
@@ -1239,7 +1244,7 @@
           <a:p>
             <a:fld id="{3339173D-53CC-4538-9D97-FAD269B40F5D}" type="datetimeFigureOut">
               <a:rPr lang="es-VE" smtClean="0"/>
-              <a:t>22/7/2016</a:t>
+              <a:t>25/7/2016</a:t>
             </a:fld>
             <a:endParaRPr lang="es-VE"/>
           </a:p>
@@ -1606,7 +1611,7 @@
           <a:p>
             <a:fld id="{3339173D-53CC-4538-9D97-FAD269B40F5D}" type="datetimeFigureOut">
               <a:rPr lang="es-VE" smtClean="0"/>
-              <a:t>22/7/2016</a:t>
+              <a:t>25/7/2016</a:t>
             </a:fld>
             <a:endParaRPr lang="es-VE"/>
           </a:p>
@@ -1724,7 +1729,7 @@
           <a:p>
             <a:fld id="{3339173D-53CC-4538-9D97-FAD269B40F5D}" type="datetimeFigureOut">
               <a:rPr lang="es-VE" smtClean="0"/>
-              <a:t>22/7/2016</a:t>
+              <a:t>25/7/2016</a:t>
             </a:fld>
             <a:endParaRPr lang="es-VE"/>
           </a:p>
@@ -1819,7 +1824,7 @@
           <a:p>
             <a:fld id="{3339173D-53CC-4538-9D97-FAD269B40F5D}" type="datetimeFigureOut">
               <a:rPr lang="es-VE" smtClean="0"/>
-              <a:t>22/7/2016</a:t>
+              <a:t>25/7/2016</a:t>
             </a:fld>
             <a:endParaRPr lang="es-VE"/>
           </a:p>
@@ -2096,7 +2101,7 @@
           <a:p>
             <a:fld id="{3339173D-53CC-4538-9D97-FAD269B40F5D}" type="datetimeFigureOut">
               <a:rPr lang="es-VE" smtClean="0"/>
-              <a:t>22/7/2016</a:t>
+              <a:t>25/7/2016</a:t>
             </a:fld>
             <a:endParaRPr lang="es-VE"/>
           </a:p>
@@ -2349,7 +2354,7 @@
           <a:p>
             <a:fld id="{3339173D-53CC-4538-9D97-FAD269B40F5D}" type="datetimeFigureOut">
               <a:rPr lang="es-VE" smtClean="0"/>
-              <a:t>22/7/2016</a:t>
+              <a:t>25/7/2016</a:t>
             </a:fld>
             <a:endParaRPr lang="es-VE"/>
           </a:p>
@@ -2562,7 +2567,7 @@
           <a:p>
             <a:fld id="{3339173D-53CC-4538-9D97-FAD269B40F5D}" type="datetimeFigureOut">
               <a:rPr lang="es-VE" smtClean="0"/>
-              <a:t>22/7/2016</a:t>
+              <a:t>25/7/2016</a:t>
             </a:fld>
             <a:endParaRPr lang="es-VE"/>
           </a:p>
@@ -3823,219 +3828,261 @@
           <a:chExt cx="0" cy="0"/>
         </a:xfrm>
       </p:grpSpPr>
+      <p:sp>
+        <p:nvSpPr>
+          <p:cNvPr id="5" name="CuadroTexto 4"/>
+          <p:cNvSpPr txBox="1"/>
+          <p:nvPr/>
+        </p:nvSpPr>
+        <p:spPr>
+          <a:xfrm>
+            <a:off x="965915" y="601152"/>
+            <a:ext cx="1685654" cy="707886"/>
+          </a:xfrm>
+          <a:prstGeom prst="rect">
+            <a:avLst/>
+          </a:prstGeom>
+          <a:noFill/>
+        </p:spPr>
+        <p:txBody>
+          <a:bodyPr wrap="none" rtlCol="0">
+            <a:spAutoFit/>
+          </a:bodyPr>
+          <a:lstStyle/>
+          <a:p>
+            <a:r>
+              <a:rPr lang="es-VE" sz="2000" b="1" dirty="0" smtClean="0"/>
+              <a:t>Contenido: </a:t>
+            </a:r>
+          </a:p>
+          <a:p>
+            <a:r>
+              <a:rPr lang="es-VE" sz="2000" b="1" dirty="0" err="1" smtClean="0"/>
+              <a:t>Tab</a:t>
+            </a:r>
+            <a:r>
+              <a:rPr lang="es-VE" sz="2000" b="1" dirty="0"/>
+              <a:t> </a:t>
+            </a:r>
+            <a:r>
+              <a:rPr lang="es-VE" sz="2000" b="1" dirty="0" smtClean="0"/>
+              <a:t>Productos</a:t>
+            </a:r>
+            <a:endParaRPr lang="es-VE" sz="2000" b="1" dirty="0"/>
+          </a:p>
+        </p:txBody>
+      </p:sp>
+      <p:sp>
+        <p:nvSpPr>
+          <p:cNvPr id="6" name="CuadroTexto 5"/>
+          <p:cNvSpPr txBox="1"/>
+          <p:nvPr/>
+        </p:nvSpPr>
+        <p:spPr>
+          <a:xfrm>
+            <a:off x="824248" y="3428999"/>
+            <a:ext cx="3393996" cy="3139321"/>
+          </a:xfrm>
+          <a:prstGeom prst="rect">
+            <a:avLst/>
+          </a:prstGeom>
+          <a:noFill/>
+        </p:spPr>
+        <p:txBody>
+          <a:bodyPr wrap="square" rtlCol="0">
+            <a:spAutoFit/>
+          </a:bodyPr>
+          <a:lstStyle/>
+          <a:p>
+            <a:r>
+              <a:rPr lang="es-VE" dirty="0" smtClean="0"/>
+              <a:t>Tarjetas (</a:t>
+            </a:r>
+            <a:r>
+              <a:rPr lang="es-VE" dirty="0" err="1" smtClean="0"/>
+              <a:t>cards</a:t>
+            </a:r>
+            <a:r>
+              <a:rPr lang="es-VE" dirty="0" smtClean="0"/>
+              <a:t>)De productos,</a:t>
+            </a:r>
+          </a:p>
+          <a:p>
+            <a:r>
+              <a:rPr lang="es-VE" dirty="0" err="1" smtClean="0"/>
+              <a:t>Scrolling</a:t>
+            </a:r>
+            <a:r>
+              <a:rPr lang="es-VE" dirty="0" smtClean="0"/>
+              <a:t> hacia abajo para mostrar más productos ,</a:t>
+            </a:r>
+          </a:p>
+          <a:p>
+            <a:r>
+              <a:rPr lang="es-VE" dirty="0" smtClean="0"/>
+              <a:t>Muestra:</a:t>
+            </a:r>
+          </a:p>
+          <a:p>
+            <a:r>
+              <a:rPr lang="es-VE" dirty="0"/>
+              <a:t> </a:t>
+            </a:r>
+            <a:r>
+              <a:rPr lang="es-VE" dirty="0" smtClean="0"/>
+              <a:t>    - Nombre de producto</a:t>
+            </a:r>
+          </a:p>
+          <a:p>
+            <a:r>
+              <a:rPr lang="es-VE" dirty="0"/>
+              <a:t> </a:t>
+            </a:r>
+            <a:r>
+              <a:rPr lang="es-VE" dirty="0" smtClean="0"/>
+              <a:t>    - Existencia (verde u otro color)</a:t>
+            </a:r>
+          </a:p>
+          <a:p>
+            <a:r>
+              <a:rPr lang="es-VE" dirty="0"/>
+              <a:t> </a:t>
+            </a:r>
+            <a:r>
+              <a:rPr lang="es-VE" dirty="0" smtClean="0"/>
+              <a:t>    - Precio</a:t>
+            </a:r>
+          </a:p>
+          <a:p>
+            <a:r>
+              <a:rPr lang="es-VE" dirty="0"/>
+              <a:t> </a:t>
+            </a:r>
+            <a:r>
+              <a:rPr lang="es-VE" dirty="0" smtClean="0"/>
+              <a:t>    - Cantidad a pedir</a:t>
+            </a:r>
+          </a:p>
+          <a:p>
+            <a:endParaRPr lang="es-VE" dirty="0"/>
+          </a:p>
+          <a:p>
+            <a:r>
+              <a:rPr lang="es-VE" dirty="0" smtClean="0"/>
+              <a:t>Se puede incluir un ícono a las tarjetas</a:t>
+            </a:r>
+            <a:endParaRPr lang="es-VE" dirty="0"/>
+          </a:p>
+        </p:txBody>
+      </p:sp>
+      <p:sp>
+        <p:nvSpPr>
+          <p:cNvPr id="7" name="CuadroTexto 6"/>
+          <p:cNvSpPr txBox="1"/>
+          <p:nvPr/>
+        </p:nvSpPr>
+        <p:spPr>
+          <a:xfrm>
+            <a:off x="8075054" y="2125014"/>
+            <a:ext cx="2255426" cy="923330"/>
+          </a:xfrm>
+          <a:prstGeom prst="rect">
+            <a:avLst/>
+          </a:prstGeom>
+          <a:noFill/>
+        </p:spPr>
+        <p:txBody>
+          <a:bodyPr wrap="none" rtlCol="0">
+            <a:spAutoFit/>
+          </a:bodyPr>
+          <a:lstStyle/>
+          <a:p>
+            <a:r>
+              <a:rPr lang="es-VE" dirty="0" smtClean="0"/>
+              <a:t>Botón de Búsqueda,</a:t>
+            </a:r>
+          </a:p>
+          <a:p>
+            <a:r>
+              <a:rPr lang="es-VE" dirty="0" smtClean="0"/>
+              <a:t>Se puede incluir icono</a:t>
+            </a:r>
+          </a:p>
+          <a:p>
+            <a:r>
+              <a:rPr lang="es-VE" dirty="0" smtClean="0"/>
+              <a:t>Y cambiar color</a:t>
+            </a:r>
+            <a:endParaRPr lang="es-VE" dirty="0"/>
+          </a:p>
+        </p:txBody>
+      </p:sp>
+      <p:sp>
+        <p:nvSpPr>
+          <p:cNvPr id="16" name="CuadroTexto 15"/>
+          <p:cNvSpPr txBox="1"/>
+          <p:nvPr/>
+        </p:nvSpPr>
+        <p:spPr>
+          <a:xfrm>
+            <a:off x="1004839" y="1663349"/>
+            <a:ext cx="1925464" cy="646331"/>
+          </a:xfrm>
+          <a:prstGeom prst="rect">
+            <a:avLst/>
+          </a:prstGeom>
+          <a:noFill/>
+        </p:spPr>
+        <p:txBody>
+          <a:bodyPr wrap="none" rtlCol="0">
+            <a:spAutoFit/>
+          </a:bodyPr>
+          <a:lstStyle/>
+          <a:p>
+            <a:r>
+              <a:rPr lang="es-VE" dirty="0" smtClean="0"/>
+              <a:t>Filtro de producto </a:t>
+            </a:r>
+          </a:p>
+          <a:p>
+            <a:r>
+              <a:rPr lang="es-VE" dirty="0" smtClean="0"/>
+              <a:t>Por nombre</a:t>
+            </a:r>
+            <a:endParaRPr lang="es-VE" dirty="0"/>
+          </a:p>
+        </p:txBody>
+      </p:sp>
       <p:pic>
         <p:nvPicPr>
-          <p:cNvPr id="4" name="Imagen 3"/>
+          <p:cNvPr id="2" name="Imagen 1"/>
           <p:cNvPicPr>
             <a:picLocks noChangeAspect="1"/>
           </p:cNvPicPr>
           <p:nvPr/>
         </p:nvPicPr>
         <p:blipFill>
-          <a:blip r:embed="rId2"/>
+          <a:blip r:embed="rId2">
+            <a:extLst>
+              <a:ext uri="{28A0092B-C50C-407E-A947-70E740481C1C}">
+                <a14:useLocalDpi xmlns:a14="http://schemas.microsoft.com/office/drawing/2010/main" val="0"/>
+              </a:ext>
+            </a:extLst>
+          </a:blip>
           <a:stretch>
             <a:fillRect/>
           </a:stretch>
         </p:blipFill>
         <p:spPr>
           <a:xfrm>
-            <a:off x="4557712" y="728662"/>
-            <a:ext cx="3076575" cy="5400675"/>
+            <a:off x="4498695" y="738186"/>
+            <a:ext cx="3048000" cy="5381625"/>
           </a:xfrm>
           <a:prstGeom prst="rect">
             <a:avLst/>
           </a:prstGeom>
         </p:spPr>
       </p:pic>
-      <p:sp>
-        <p:nvSpPr>
-          <p:cNvPr id="5" name="CuadroTexto 4"/>
-          <p:cNvSpPr txBox="1"/>
-          <p:nvPr/>
-        </p:nvSpPr>
-        <p:spPr>
-          <a:xfrm>
-            <a:off x="965915" y="601152"/>
-            <a:ext cx="1685654" cy="707886"/>
-          </a:xfrm>
-          <a:prstGeom prst="rect">
-            <a:avLst/>
-          </a:prstGeom>
-          <a:noFill/>
-        </p:spPr>
-        <p:txBody>
-          <a:bodyPr wrap="none" rtlCol="0">
-            <a:spAutoFit/>
-          </a:bodyPr>
-          <a:lstStyle/>
-          <a:p>
-            <a:r>
-              <a:rPr lang="es-VE" sz="2000" b="1" dirty="0" smtClean="0"/>
-              <a:t>Contenido: </a:t>
-            </a:r>
-          </a:p>
-          <a:p>
-            <a:r>
-              <a:rPr lang="es-VE" sz="2000" b="1" dirty="0" err="1" smtClean="0"/>
-              <a:t>Tab</a:t>
-            </a:r>
-            <a:r>
-              <a:rPr lang="es-VE" sz="2000" b="1" dirty="0"/>
-              <a:t> </a:t>
-            </a:r>
-            <a:r>
-              <a:rPr lang="es-VE" sz="2000" b="1" dirty="0" smtClean="0"/>
-              <a:t>Productos</a:t>
-            </a:r>
-            <a:endParaRPr lang="es-VE" sz="2000" b="1" dirty="0"/>
-          </a:p>
-        </p:txBody>
-      </p:sp>
-      <p:sp>
-        <p:nvSpPr>
-          <p:cNvPr id="6" name="CuadroTexto 5"/>
-          <p:cNvSpPr txBox="1"/>
-          <p:nvPr/>
-        </p:nvSpPr>
-        <p:spPr>
-          <a:xfrm>
-            <a:off x="824248" y="3428999"/>
-            <a:ext cx="3393996" cy="3139321"/>
-          </a:xfrm>
-          <a:prstGeom prst="rect">
-            <a:avLst/>
-          </a:prstGeom>
-          <a:noFill/>
-        </p:spPr>
-        <p:txBody>
-          <a:bodyPr wrap="square" rtlCol="0">
-            <a:spAutoFit/>
-          </a:bodyPr>
-          <a:lstStyle/>
-          <a:p>
-            <a:r>
-              <a:rPr lang="es-VE" dirty="0" smtClean="0"/>
-              <a:t>Tarjetas (</a:t>
-            </a:r>
-            <a:r>
-              <a:rPr lang="es-VE" dirty="0" err="1" smtClean="0"/>
-              <a:t>cards</a:t>
-            </a:r>
-            <a:r>
-              <a:rPr lang="es-VE" dirty="0" smtClean="0"/>
-              <a:t>)De productos,</a:t>
-            </a:r>
-          </a:p>
-          <a:p>
-            <a:r>
-              <a:rPr lang="es-VE" dirty="0" err="1" smtClean="0"/>
-              <a:t>Scrolling</a:t>
-            </a:r>
-            <a:r>
-              <a:rPr lang="es-VE" dirty="0" smtClean="0"/>
-              <a:t> hacia abajo para mostrar más productos ,</a:t>
-            </a:r>
-          </a:p>
-          <a:p>
-            <a:r>
-              <a:rPr lang="es-VE" dirty="0" smtClean="0"/>
-              <a:t>Muestra:</a:t>
-            </a:r>
-          </a:p>
-          <a:p>
-            <a:r>
-              <a:rPr lang="es-VE" dirty="0"/>
-              <a:t> </a:t>
-            </a:r>
-            <a:r>
-              <a:rPr lang="es-VE" dirty="0" smtClean="0"/>
-              <a:t>    - Nombre de producto</a:t>
-            </a:r>
-          </a:p>
-          <a:p>
-            <a:r>
-              <a:rPr lang="es-VE" dirty="0"/>
-              <a:t> </a:t>
-            </a:r>
-            <a:r>
-              <a:rPr lang="es-VE" dirty="0" smtClean="0"/>
-              <a:t>    - Existencia (verde u otro color)</a:t>
-            </a:r>
-          </a:p>
-          <a:p>
-            <a:r>
-              <a:rPr lang="es-VE" dirty="0"/>
-              <a:t> </a:t>
-            </a:r>
-            <a:r>
-              <a:rPr lang="es-VE" dirty="0" smtClean="0"/>
-              <a:t>    - Precio</a:t>
-            </a:r>
-          </a:p>
-          <a:p>
-            <a:r>
-              <a:rPr lang="es-VE" dirty="0"/>
-              <a:t> </a:t>
-            </a:r>
-            <a:r>
-              <a:rPr lang="es-VE" dirty="0" smtClean="0"/>
-              <a:t>    - Cantidad a pedir</a:t>
-            </a:r>
-          </a:p>
-          <a:p>
-            <a:endParaRPr lang="es-VE" dirty="0"/>
-          </a:p>
-          <a:p>
-            <a:r>
-              <a:rPr lang="es-VE" dirty="0" smtClean="0"/>
-              <a:t>Se puede incluir un ícono a las tarjetas</a:t>
-            </a:r>
-            <a:endParaRPr lang="es-VE" dirty="0"/>
-          </a:p>
-        </p:txBody>
-      </p:sp>
-      <p:sp>
-        <p:nvSpPr>
-          <p:cNvPr id="7" name="CuadroTexto 6"/>
-          <p:cNvSpPr txBox="1"/>
-          <p:nvPr/>
-        </p:nvSpPr>
-        <p:spPr>
-          <a:xfrm>
-            <a:off x="8075054" y="2125014"/>
-            <a:ext cx="2255426" cy="923330"/>
-          </a:xfrm>
-          <a:prstGeom prst="rect">
-            <a:avLst/>
-          </a:prstGeom>
-          <a:noFill/>
-        </p:spPr>
-        <p:txBody>
-          <a:bodyPr wrap="none" rtlCol="0">
-            <a:spAutoFit/>
-          </a:bodyPr>
-          <a:lstStyle/>
-          <a:p>
-            <a:r>
-              <a:rPr lang="es-VE" dirty="0" smtClean="0"/>
-              <a:t>Botón de Búsqueda,</a:t>
-            </a:r>
-          </a:p>
-          <a:p>
-            <a:r>
-              <a:rPr lang="es-VE" dirty="0" smtClean="0"/>
-              <a:t>Se puede incluir icono</a:t>
-            </a:r>
-          </a:p>
-          <a:p>
-            <a:r>
-              <a:rPr lang="es-VE" dirty="0" smtClean="0"/>
-              <a:t>Y cambiar color</a:t>
-            </a:r>
-            <a:endParaRPr lang="es-VE" dirty="0"/>
-          </a:p>
-        </p:txBody>
-      </p:sp>
       <p:cxnSp>
         <p:nvCxnSpPr>
           <p:cNvPr id="9" name="Conector recto de flecha 8"/>
@@ -4046,6 +4093,41 @@
           <a:xfrm flipH="1">
             <a:off x="6362163" y="2309680"/>
             <a:ext cx="1571223" cy="369126"/>
+          </a:xfrm>
+          <a:prstGeom prst="straightConnector1">
+            <a:avLst/>
+          </a:prstGeom>
+          <a:ln>
+            <a:tailEnd type="triangle"/>
+          </a:ln>
+        </p:spPr>
+        <p:style>
+          <a:lnRef idx="1">
+            <a:schemeClr val="accent1"/>
+          </a:lnRef>
+          <a:fillRef idx="0">
+            <a:schemeClr val="accent1"/>
+          </a:fillRef>
+          <a:effectRef idx="0">
+            <a:schemeClr val="accent1"/>
+          </a:effectRef>
+          <a:fontRef idx="minor">
+            <a:schemeClr val="tx1"/>
+          </a:fontRef>
+        </p:style>
+      </p:cxnSp>
+      <p:cxnSp>
+        <p:nvCxnSpPr>
+          <p:cNvPr id="17" name="Conector recto de flecha 16"/>
+          <p:cNvCxnSpPr>
+            <a:stCxn id="16" idx="3"/>
+          </p:cNvCxnSpPr>
+          <p:nvPr/>
+        </p:nvCxnSpPr>
+        <p:spPr>
+          <a:xfrm>
+            <a:off x="2930303" y="1986515"/>
+            <a:ext cx="1627409" cy="795322"/>
           </a:xfrm>
           <a:prstGeom prst="straightConnector1">
             <a:avLst/>
@@ -4112,77 +4194,6 @@
           <a:xfrm>
             <a:off x="3878686" y="4653995"/>
             <a:ext cx="679026" cy="301153"/>
-          </a:xfrm>
-          <a:prstGeom prst="straightConnector1">
-            <a:avLst/>
-          </a:prstGeom>
-          <a:ln>
-            <a:tailEnd type="triangle"/>
-          </a:ln>
-        </p:spPr>
-        <p:style>
-          <a:lnRef idx="1">
-            <a:schemeClr val="accent1"/>
-          </a:lnRef>
-          <a:fillRef idx="0">
-            <a:schemeClr val="accent1"/>
-          </a:fillRef>
-          <a:effectRef idx="0">
-            <a:schemeClr val="accent1"/>
-          </a:effectRef>
-          <a:fontRef idx="minor">
-            <a:schemeClr val="tx1"/>
-          </a:fontRef>
-        </p:style>
-      </p:cxnSp>
-      <p:sp>
-        <p:nvSpPr>
-          <p:cNvPr id="16" name="CuadroTexto 15"/>
-          <p:cNvSpPr txBox="1"/>
-          <p:nvPr/>
-        </p:nvSpPr>
-        <p:spPr>
-          <a:xfrm>
-            <a:off x="1004839" y="1663349"/>
-            <a:ext cx="1925464" cy="646331"/>
-          </a:xfrm>
-          <a:prstGeom prst="rect">
-            <a:avLst/>
-          </a:prstGeom>
-          <a:noFill/>
-        </p:spPr>
-        <p:txBody>
-          <a:bodyPr wrap="none" rtlCol="0">
-            <a:spAutoFit/>
-          </a:bodyPr>
-          <a:lstStyle/>
-          <a:p>
-            <a:r>
-              <a:rPr lang="es-VE" dirty="0" smtClean="0"/>
-              <a:t>Filtro de producto </a:t>
-            </a:r>
-          </a:p>
-          <a:p>
-            <a:r>
-              <a:rPr lang="es-VE" dirty="0" smtClean="0"/>
-              <a:t>Por nombre</a:t>
-            </a:r>
-            <a:endParaRPr lang="es-VE" dirty="0"/>
-          </a:p>
-        </p:txBody>
-      </p:sp>
-      <p:cxnSp>
-        <p:nvCxnSpPr>
-          <p:cNvPr id="17" name="Conector recto de flecha 16"/>
-          <p:cNvCxnSpPr>
-            <a:stCxn id="16" idx="3"/>
-          </p:cNvCxnSpPr>
-          <p:nvPr/>
-        </p:nvCxnSpPr>
-        <p:spPr>
-          <a:xfrm>
-            <a:off x="2930303" y="1986515"/>
-            <a:ext cx="1627409" cy="795322"/>
           </a:xfrm>
           <a:prstGeom prst="straightConnector1">
             <a:avLst/>
@@ -4236,24 +4247,118 @@
           <a:chExt cx="0" cy="0"/>
         </a:xfrm>
       </p:grpSpPr>
+      <p:sp>
+        <p:nvSpPr>
+          <p:cNvPr id="8" name="CuadroTexto 7"/>
+          <p:cNvSpPr txBox="1"/>
+          <p:nvPr/>
+        </p:nvSpPr>
+        <p:spPr>
+          <a:xfrm>
+            <a:off x="965915" y="601152"/>
+            <a:ext cx="1714765" cy="707886"/>
+          </a:xfrm>
+          <a:prstGeom prst="rect">
+            <a:avLst/>
+          </a:prstGeom>
+          <a:noFill/>
+        </p:spPr>
+        <p:txBody>
+          <a:bodyPr wrap="none" rtlCol="0">
+            <a:spAutoFit/>
+          </a:bodyPr>
+          <a:lstStyle/>
+          <a:p>
+            <a:r>
+              <a:rPr lang="es-VE" sz="2000" b="1" dirty="0" smtClean="0"/>
+              <a:t>Contenido: </a:t>
+            </a:r>
+          </a:p>
+          <a:p>
+            <a:r>
+              <a:rPr lang="es-VE" sz="2000" b="1" dirty="0" err="1" smtClean="0"/>
+              <a:t>Tab</a:t>
+            </a:r>
+            <a:r>
+              <a:rPr lang="es-VE" sz="2000" b="1" dirty="0"/>
+              <a:t> </a:t>
+            </a:r>
+            <a:r>
+              <a:rPr lang="es-VE" sz="2000" b="1" dirty="0" smtClean="0"/>
+              <a:t>Renglones</a:t>
+            </a:r>
+            <a:endParaRPr lang="es-VE" sz="2000" b="1" dirty="0"/>
+          </a:p>
+        </p:txBody>
+      </p:sp>
+      <p:sp>
+        <p:nvSpPr>
+          <p:cNvPr id="9" name="CuadroTexto 8"/>
+          <p:cNvSpPr txBox="1"/>
+          <p:nvPr/>
+        </p:nvSpPr>
+        <p:spPr>
+          <a:xfrm>
+            <a:off x="8075054" y="2125014"/>
+            <a:ext cx="2694648" cy="646331"/>
+          </a:xfrm>
+          <a:prstGeom prst="rect">
+            <a:avLst/>
+          </a:prstGeom>
+          <a:noFill/>
+        </p:spPr>
+        <p:txBody>
+          <a:bodyPr wrap="none" rtlCol="0">
+            <a:spAutoFit/>
+          </a:bodyPr>
+          <a:lstStyle/>
+          <a:p>
+            <a:r>
+              <a:rPr lang="es-VE" dirty="0" smtClean="0"/>
+              <a:t>Botón para borrar renglón,</a:t>
+            </a:r>
+          </a:p>
+          <a:p>
+            <a:r>
+              <a:rPr lang="es-VE" dirty="0" smtClean="0"/>
+              <a:t>Se </a:t>
+            </a:r>
+            <a:r>
+              <a:rPr lang="es-VE" dirty="0" smtClean="0"/>
+              <a:t>puede cambiar </a:t>
+            </a:r>
+            <a:r>
+              <a:rPr lang="es-VE" dirty="0" smtClean="0"/>
+              <a:t>color</a:t>
+            </a:r>
+            <a:endParaRPr lang="es-VE" dirty="0"/>
+          </a:p>
+        </p:txBody>
+      </p:sp>
       <p:pic>
         <p:nvPicPr>
-          <p:cNvPr id="4" name="Imagen 3"/>
+          <p:cNvPr id="2" name="Imagen 1"/>
           <p:cNvPicPr>
             <a:picLocks noChangeAspect="1"/>
           </p:cNvPicPr>
           <p:nvPr/>
         </p:nvPicPr>
         <p:blipFill>
-          <a:blip r:embed="rId2"/>
+          <a:blip r:embed="rId2">
+            <a:extLst>
+              <a:ext uri="{28A0092B-C50C-407E-A947-70E740481C1C}">
+                <a14:useLocalDpi xmlns:a14="http://schemas.microsoft.com/office/drawing/2010/main" val="0"/>
+              </a:ext>
+            </a:extLst>
+          </a:blip>
           <a:stretch>
             <a:fillRect/>
           </a:stretch>
         </p:blipFill>
         <p:spPr>
           <a:xfrm>
-            <a:off x="4026325" y="493489"/>
-            <a:ext cx="3057525" cy="5381625"/>
+            <a:off x="4299397" y="584118"/>
+            <a:ext cx="3048000" cy="5105400"/>
           </a:xfrm>
           <a:prstGeom prst="rect">
             <a:avLst/>
@@ -4293,92 +4398,6 @@
           </a:fontRef>
         </p:style>
       </p:cxnSp>
-      <p:sp>
-        <p:nvSpPr>
-          <p:cNvPr id="8" name="CuadroTexto 7"/>
-          <p:cNvSpPr txBox="1"/>
-          <p:nvPr/>
-        </p:nvSpPr>
-        <p:spPr>
-          <a:xfrm>
-            <a:off x="965915" y="601152"/>
-            <a:ext cx="1714765" cy="707886"/>
-          </a:xfrm>
-          <a:prstGeom prst="rect">
-            <a:avLst/>
-          </a:prstGeom>
-          <a:noFill/>
-        </p:spPr>
-        <p:txBody>
-          <a:bodyPr wrap="none" rtlCol="0">
-            <a:spAutoFit/>
-          </a:bodyPr>
-          <a:lstStyle/>
-          <a:p>
-            <a:r>
-              <a:rPr lang="es-VE" sz="2000" b="1" dirty="0" smtClean="0"/>
-              <a:t>Contenido: </a:t>
-            </a:r>
-          </a:p>
-          <a:p>
-            <a:r>
-              <a:rPr lang="es-VE" sz="2000" b="1" dirty="0" err="1" smtClean="0"/>
-              <a:t>Tab</a:t>
-            </a:r>
-            <a:r>
-              <a:rPr lang="es-VE" sz="2000" b="1" dirty="0"/>
-              <a:t> </a:t>
-            </a:r>
-            <a:r>
-              <a:rPr lang="es-VE" sz="2000" b="1" dirty="0" smtClean="0"/>
-              <a:t>Renglones</a:t>
-            </a:r>
-            <a:endParaRPr lang="es-VE" sz="2000" b="1" dirty="0"/>
-          </a:p>
-        </p:txBody>
-      </p:sp>
-      <p:sp>
-        <p:nvSpPr>
-          <p:cNvPr id="9" name="CuadroTexto 8"/>
-          <p:cNvSpPr txBox="1"/>
-          <p:nvPr/>
-        </p:nvSpPr>
-        <p:spPr>
-          <a:xfrm>
-            <a:off x="8075054" y="2125014"/>
-            <a:ext cx="2694648" cy="923330"/>
-          </a:xfrm>
-          <a:prstGeom prst="rect">
-            <a:avLst/>
-          </a:prstGeom>
-          <a:noFill/>
-        </p:spPr>
-        <p:txBody>
-          <a:bodyPr wrap="none" rtlCol="0">
-            <a:spAutoFit/>
-          </a:bodyPr>
-          <a:lstStyle/>
-          <a:p>
-            <a:r>
-              <a:rPr lang="es-VE" dirty="0" smtClean="0"/>
-              <a:t>Botón para borrar renglón,</a:t>
-            </a:r>
-          </a:p>
-          <a:p>
-            <a:r>
-              <a:rPr lang="es-VE" dirty="0" smtClean="0"/>
-              <a:t>Se puede incluir icono</a:t>
-            </a:r>
-          </a:p>
-          <a:p>
-            <a:r>
-              <a:rPr lang="es-VE" dirty="0" smtClean="0"/>
-              <a:t>Y cambiar color</a:t>
-            </a:r>
-            <a:endParaRPr lang="es-VE" dirty="0"/>
-          </a:p>
-        </p:txBody>
-      </p:sp>
     </p:spTree>
     <p:extLst>
       <p:ext uri="{BB962C8B-B14F-4D97-AF65-F5344CB8AC3E}">
@@ -4409,10 +4428,352 @@
           <a:chExt cx="0" cy="0"/>
         </a:xfrm>
       </p:grpSpPr>
+      <p:sp>
+        <p:nvSpPr>
+          <p:cNvPr id="8" name="CuadroTexto 7"/>
+          <p:cNvSpPr txBox="1"/>
+          <p:nvPr/>
+        </p:nvSpPr>
+        <p:spPr>
+          <a:xfrm>
+            <a:off x="386366" y="396942"/>
+            <a:ext cx="872355" cy="400110"/>
+          </a:xfrm>
+          <a:prstGeom prst="rect">
+            <a:avLst/>
+          </a:prstGeom>
+          <a:noFill/>
+        </p:spPr>
+        <p:txBody>
+          <a:bodyPr wrap="none" rtlCol="0">
+            <a:spAutoFit/>
+          </a:bodyPr>
+          <a:lstStyle/>
+          <a:p>
+            <a:r>
+              <a:rPr lang="es-VE" sz="2000" b="1" dirty="0" smtClean="0"/>
+              <a:t>Menú</a:t>
+            </a:r>
+            <a:r>
+              <a:rPr lang="es-VE" sz="2000" b="1" dirty="0" smtClean="0"/>
+              <a:t> </a:t>
+            </a:r>
+            <a:endParaRPr lang="es-VE" sz="2000" b="1" dirty="0" smtClean="0"/>
+          </a:p>
+        </p:txBody>
+      </p:sp>
+      <p:pic>
+        <p:nvPicPr>
+          <p:cNvPr id="3" name="Imagen 2"/>
+          <p:cNvPicPr>
+            <a:picLocks noChangeAspect="1"/>
+          </p:cNvPicPr>
+          <p:nvPr/>
+        </p:nvPicPr>
+        <p:blipFill>
+          <a:blip r:embed="rId2">
+            <a:extLst>
+              <a:ext uri="{28A0092B-C50C-407E-A947-70E740481C1C}">
+                <a14:useLocalDpi xmlns:a14="http://schemas.microsoft.com/office/drawing/2010/main" val="0"/>
+              </a:ext>
+            </a:extLst>
+          </a:blip>
+          <a:stretch>
+            <a:fillRect/>
+          </a:stretch>
+        </p:blipFill>
+        <p:spPr>
+          <a:xfrm>
+            <a:off x="3966693" y="801207"/>
+            <a:ext cx="3048000" cy="5381625"/>
+          </a:xfrm>
+          <a:prstGeom prst="rect">
+            <a:avLst/>
+          </a:prstGeom>
+        </p:spPr>
+      </p:pic>
+      <p:sp>
+        <p:nvSpPr>
+          <p:cNvPr id="10" name="CuadroTexto 9"/>
+          <p:cNvSpPr txBox="1"/>
+          <p:nvPr/>
+        </p:nvSpPr>
+        <p:spPr>
+          <a:xfrm>
+            <a:off x="3753421" y="231820"/>
+            <a:ext cx="4088876" cy="369332"/>
+          </a:xfrm>
+          <a:prstGeom prst="rect">
+            <a:avLst/>
+          </a:prstGeom>
+          <a:noFill/>
+        </p:spPr>
+        <p:txBody>
+          <a:bodyPr wrap="none" rtlCol="0">
+            <a:spAutoFit/>
+          </a:bodyPr>
+          <a:lstStyle/>
+          <a:p>
+            <a:r>
+              <a:rPr lang="es-VE" b="1" dirty="0" smtClean="0"/>
+              <a:t>Ancho Menú : 220 </a:t>
+            </a:r>
+            <a:r>
+              <a:rPr lang="es-VE" b="1" dirty="0" err="1" smtClean="0"/>
+              <a:t>px</a:t>
+            </a:r>
+            <a:r>
+              <a:rPr lang="es-VE" b="1" dirty="0" smtClean="0"/>
+              <a:t> (se puede cambiar)</a:t>
+            </a:r>
+            <a:endParaRPr lang="es-VE" b="1" dirty="0"/>
+          </a:p>
+        </p:txBody>
+      </p:sp>
+      <p:sp>
+        <p:nvSpPr>
+          <p:cNvPr id="11" name="CuadroTexto 10"/>
+          <p:cNvSpPr txBox="1"/>
+          <p:nvPr/>
+        </p:nvSpPr>
+        <p:spPr>
+          <a:xfrm>
+            <a:off x="1812898" y="810796"/>
+            <a:ext cx="2153795" cy="923330"/>
+          </a:xfrm>
+          <a:prstGeom prst="rect">
+            <a:avLst/>
+          </a:prstGeom>
+          <a:noFill/>
+        </p:spPr>
+        <p:txBody>
+          <a:bodyPr wrap="none" rtlCol="0">
+            <a:spAutoFit/>
+          </a:bodyPr>
+          <a:lstStyle/>
+          <a:p>
+            <a:r>
+              <a:rPr lang="es-VE" b="1" dirty="0" smtClean="0"/>
+              <a:t>Alto barra </a:t>
+            </a:r>
+          </a:p>
+          <a:p>
+            <a:r>
+              <a:rPr lang="es-VE" b="1" dirty="0" smtClean="0"/>
+              <a:t>Título Menú</a:t>
+            </a:r>
+            <a:r>
+              <a:rPr lang="es-VE" b="1" dirty="0" smtClean="0"/>
+              <a:t> : 120 </a:t>
+            </a:r>
+            <a:r>
+              <a:rPr lang="es-VE" b="1" dirty="0" err="1" smtClean="0"/>
+              <a:t>px</a:t>
+            </a:r>
+            <a:endParaRPr lang="es-VE" b="1" dirty="0" smtClean="0"/>
+          </a:p>
+          <a:p>
+            <a:r>
+              <a:rPr lang="es-VE" b="1" dirty="0" smtClean="0"/>
+              <a:t>(se puede Cambiar)</a:t>
+            </a:r>
+            <a:endParaRPr lang="es-VE" b="1" dirty="0"/>
+          </a:p>
+        </p:txBody>
+      </p:sp>
+      <p:sp>
+        <p:nvSpPr>
+          <p:cNvPr id="5" name="CuadroTexto 4"/>
+          <p:cNvSpPr txBox="1"/>
+          <p:nvPr/>
+        </p:nvSpPr>
+        <p:spPr>
+          <a:xfrm>
+            <a:off x="1596981" y="3047052"/>
+            <a:ext cx="1748427" cy="1477328"/>
+          </a:xfrm>
+          <a:prstGeom prst="rect">
+            <a:avLst/>
+          </a:prstGeom>
+          <a:noFill/>
+        </p:spPr>
+        <p:txBody>
+          <a:bodyPr wrap="none" rtlCol="0">
+            <a:spAutoFit/>
+          </a:bodyPr>
+          <a:lstStyle/>
+          <a:p>
+            <a:r>
+              <a:rPr lang="es-VE" dirty="0" smtClean="0"/>
+              <a:t>Colores Barra </a:t>
+            </a:r>
+          </a:p>
+          <a:p>
+            <a:r>
+              <a:rPr lang="es-VE" dirty="0" smtClean="0"/>
+              <a:t>Y Fondo se </a:t>
+            </a:r>
+          </a:p>
+          <a:p>
+            <a:r>
+              <a:rPr lang="es-VE" dirty="0" smtClean="0"/>
+              <a:t>Pueden cambiar</a:t>
+            </a:r>
+          </a:p>
+          <a:p>
+            <a:r>
+              <a:rPr lang="es-VE" dirty="0" smtClean="0"/>
+              <a:t>O definir imagen</a:t>
+            </a:r>
+          </a:p>
+          <a:p>
+            <a:r>
+              <a:rPr lang="es-VE" dirty="0" smtClean="0"/>
+              <a:t>Para barra</a:t>
+            </a:r>
+            <a:endParaRPr lang="es-VE" dirty="0"/>
+          </a:p>
+        </p:txBody>
+      </p:sp>
+      <p:cxnSp>
+        <p:nvCxnSpPr>
+          <p:cNvPr id="12" name="Conector recto de flecha 11"/>
+          <p:cNvCxnSpPr/>
+          <p:nvPr/>
+        </p:nvCxnSpPr>
+        <p:spPr>
+          <a:xfrm>
+            <a:off x="3116687" y="3953684"/>
+            <a:ext cx="1056068" cy="425133"/>
+          </a:xfrm>
+          <a:prstGeom prst="straightConnector1">
+            <a:avLst/>
+          </a:prstGeom>
+          <a:ln>
+            <a:tailEnd type="triangle"/>
+          </a:ln>
+        </p:spPr>
+        <p:style>
+          <a:lnRef idx="1">
+            <a:schemeClr val="dk1"/>
+          </a:lnRef>
+          <a:fillRef idx="0">
+            <a:schemeClr val="dk1"/>
+          </a:fillRef>
+          <a:effectRef idx="0">
+            <a:schemeClr val="dk1"/>
+          </a:effectRef>
+          <a:fontRef idx="minor">
+            <a:schemeClr val="tx1"/>
+          </a:fontRef>
+        </p:style>
+      </p:cxnSp>
+      <p:cxnSp>
+        <p:nvCxnSpPr>
+          <p:cNvPr id="14" name="Conector recto de flecha 13"/>
+          <p:cNvCxnSpPr/>
+          <p:nvPr/>
+        </p:nvCxnSpPr>
+        <p:spPr>
+          <a:xfrm flipV="1">
+            <a:off x="3116687" y="1841679"/>
+            <a:ext cx="1056068" cy="1188675"/>
+          </a:xfrm>
+          <a:prstGeom prst="straightConnector1">
+            <a:avLst/>
+          </a:prstGeom>
+          <a:ln>
+            <a:tailEnd type="triangle"/>
+          </a:ln>
+        </p:spPr>
+        <p:style>
+          <a:lnRef idx="1">
+            <a:schemeClr val="dk1"/>
+          </a:lnRef>
+          <a:fillRef idx="0">
+            <a:schemeClr val="dk1"/>
+          </a:fillRef>
+          <a:effectRef idx="0">
+            <a:schemeClr val="dk1"/>
+          </a:effectRef>
+          <a:fontRef idx="minor">
+            <a:schemeClr val="tx1"/>
+          </a:fontRef>
+        </p:style>
+      </p:cxnSp>
+      <p:sp>
+        <p:nvSpPr>
+          <p:cNvPr id="15" name="CuadroTexto 14"/>
+          <p:cNvSpPr txBox="1"/>
+          <p:nvPr/>
+        </p:nvSpPr>
+        <p:spPr>
+          <a:xfrm>
+            <a:off x="8023537" y="2112850"/>
+            <a:ext cx="2697854" cy="646331"/>
+          </a:xfrm>
+          <a:prstGeom prst="rect">
+            <a:avLst/>
+          </a:prstGeom>
+          <a:noFill/>
+        </p:spPr>
+        <p:txBody>
+          <a:bodyPr wrap="none" rtlCol="0">
+            <a:spAutoFit/>
+          </a:bodyPr>
+          <a:lstStyle/>
+          <a:p>
+            <a:r>
+              <a:rPr lang="es-VE" dirty="0" smtClean="0"/>
+              <a:t>Se puede cambiar posición</a:t>
+            </a:r>
+          </a:p>
+          <a:p>
+            <a:r>
+              <a:rPr lang="es-VE" dirty="0" smtClean="0"/>
+              <a:t>Título Menú</a:t>
+            </a:r>
+            <a:endParaRPr lang="es-VE" dirty="0"/>
+          </a:p>
+        </p:txBody>
+      </p:sp>
+      <p:cxnSp>
+        <p:nvCxnSpPr>
+          <p:cNvPr id="17" name="Conector recto de flecha 16"/>
+          <p:cNvCxnSpPr/>
+          <p:nvPr/>
+        </p:nvCxnSpPr>
+        <p:spPr>
+          <a:xfrm flipH="1" flipV="1">
+            <a:off x="5960115" y="1841679"/>
+            <a:ext cx="1921755" cy="489397"/>
+          </a:xfrm>
+          <a:prstGeom prst="straightConnector1">
+            <a:avLst/>
+          </a:prstGeom>
+          <a:ln>
+            <a:tailEnd type="triangle"/>
+          </a:ln>
+        </p:spPr>
+        <p:style>
+          <a:lnRef idx="1">
+            <a:schemeClr val="dk1"/>
+          </a:lnRef>
+          <a:fillRef idx="0">
+            <a:schemeClr val="dk1"/>
+          </a:fillRef>
+          <a:effectRef idx="0">
+            <a:schemeClr val="dk1"/>
+          </a:effectRef>
+          <a:fontRef idx="minor">
+            <a:schemeClr val="tx1"/>
+          </a:fontRef>
+        </p:style>
+      </p:cxnSp>
     </p:spTree>
     <p:extLst>
       <p:ext uri="{BB962C8B-B14F-4D97-AF65-F5344CB8AC3E}">
-        <p14:creationId xmlns:p14="http://schemas.microsoft.com/office/powerpoint/2010/main" val="4104800455"/>
+        <p14:creationId xmlns:p14="http://schemas.microsoft.com/office/powerpoint/2010/main" val="3295238134"/>
       </p:ext>
     </p:extLst>
   </p:cSld>

</xml_diff>